<commit_message>
L1 Enemy now shoots in a straight line(FIXED), Skybox added L2
</commit_message>
<xml_diff>
--- a/Documentation/Report/Report Layou.pptx
+++ b/Documentation/Report/Report Layou.pptx
@@ -276,7 +276,7 @@
           <a:p>
             <a:fld id="{5129EF8E-2A59-46EE-A340-0EE57C336FDC}" type="datetimeFigureOut">
               <a:rPr lang="en-GB" smtClean="0"/>
-              <a:t>17/04/2025</a:t>
+              <a:t>18/04/2025</a:t>
             </a:fld>
             <a:endParaRPr lang="en-GB"/>
           </a:p>
@@ -476,7 +476,7 @@
           <a:p>
             <a:fld id="{5129EF8E-2A59-46EE-A340-0EE57C336FDC}" type="datetimeFigureOut">
               <a:rPr lang="en-GB" smtClean="0"/>
-              <a:t>17/04/2025</a:t>
+              <a:t>18/04/2025</a:t>
             </a:fld>
             <a:endParaRPr lang="en-GB"/>
           </a:p>
@@ -686,7 +686,7 @@
           <a:p>
             <a:fld id="{5129EF8E-2A59-46EE-A340-0EE57C336FDC}" type="datetimeFigureOut">
               <a:rPr lang="en-GB" smtClean="0"/>
-              <a:t>17/04/2025</a:t>
+              <a:t>18/04/2025</a:t>
             </a:fld>
             <a:endParaRPr lang="en-GB"/>
           </a:p>
@@ -886,7 +886,7 @@
           <a:p>
             <a:fld id="{5129EF8E-2A59-46EE-A340-0EE57C336FDC}" type="datetimeFigureOut">
               <a:rPr lang="en-GB" smtClean="0"/>
-              <a:t>17/04/2025</a:t>
+              <a:t>18/04/2025</a:t>
             </a:fld>
             <a:endParaRPr lang="en-GB"/>
           </a:p>
@@ -1162,7 +1162,7 @@
           <a:p>
             <a:fld id="{5129EF8E-2A59-46EE-A340-0EE57C336FDC}" type="datetimeFigureOut">
               <a:rPr lang="en-GB" smtClean="0"/>
-              <a:t>17/04/2025</a:t>
+              <a:t>18/04/2025</a:t>
             </a:fld>
             <a:endParaRPr lang="en-GB"/>
           </a:p>
@@ -1430,7 +1430,7 @@
           <a:p>
             <a:fld id="{5129EF8E-2A59-46EE-A340-0EE57C336FDC}" type="datetimeFigureOut">
               <a:rPr lang="en-GB" smtClean="0"/>
-              <a:t>17/04/2025</a:t>
+              <a:t>18/04/2025</a:t>
             </a:fld>
             <a:endParaRPr lang="en-GB"/>
           </a:p>
@@ -1845,7 +1845,7 @@
           <a:p>
             <a:fld id="{5129EF8E-2A59-46EE-A340-0EE57C336FDC}" type="datetimeFigureOut">
               <a:rPr lang="en-GB" smtClean="0"/>
-              <a:t>17/04/2025</a:t>
+              <a:t>18/04/2025</a:t>
             </a:fld>
             <a:endParaRPr lang="en-GB"/>
           </a:p>
@@ -1987,7 +1987,7 @@
           <a:p>
             <a:fld id="{5129EF8E-2A59-46EE-A340-0EE57C336FDC}" type="datetimeFigureOut">
               <a:rPr lang="en-GB" smtClean="0"/>
-              <a:t>17/04/2025</a:t>
+              <a:t>18/04/2025</a:t>
             </a:fld>
             <a:endParaRPr lang="en-GB"/>
           </a:p>
@@ -2100,7 +2100,7 @@
           <a:p>
             <a:fld id="{5129EF8E-2A59-46EE-A340-0EE57C336FDC}" type="datetimeFigureOut">
               <a:rPr lang="en-GB" smtClean="0"/>
-              <a:t>17/04/2025</a:t>
+              <a:t>18/04/2025</a:t>
             </a:fld>
             <a:endParaRPr lang="en-GB"/>
           </a:p>
@@ -2413,7 +2413,7 @@
           <a:p>
             <a:fld id="{5129EF8E-2A59-46EE-A340-0EE57C336FDC}" type="datetimeFigureOut">
               <a:rPr lang="en-GB" smtClean="0"/>
-              <a:t>17/04/2025</a:t>
+              <a:t>18/04/2025</a:t>
             </a:fld>
             <a:endParaRPr lang="en-GB"/>
           </a:p>
@@ -2702,7 +2702,7 @@
           <a:p>
             <a:fld id="{5129EF8E-2A59-46EE-A340-0EE57C336FDC}" type="datetimeFigureOut">
               <a:rPr lang="en-GB" smtClean="0"/>
-              <a:t>17/04/2025</a:t>
+              <a:t>18/04/2025</a:t>
             </a:fld>
             <a:endParaRPr lang="en-GB"/>
           </a:p>
@@ -2945,7 +2945,7 @@
           <a:p>
             <a:fld id="{5129EF8E-2A59-46EE-A340-0EE57C336FDC}" type="datetimeFigureOut">
               <a:rPr lang="en-GB" smtClean="0"/>
-              <a:t>17/04/2025</a:t>
+              <a:t>18/04/2025</a:t>
             </a:fld>
             <a:endParaRPr lang="en-GB"/>
           </a:p>
@@ -4697,20 +4697,70 @@
           <a:lstStyle/>
           <a:p>
             <a:r>
+              <a:rPr lang="en-GB" dirty="0"/>
+              <a:t>This counts towards the 5k for project </a:t>
+            </a:r>
+            <a:r>
               <a:rPr lang="en-GB" dirty="0" err="1"/>
-              <a:t>Methodolige</a:t>
+              <a:t>methodologu</a:t>
             </a:r>
             <a:r>
               <a:rPr lang="en-GB" dirty="0"/>
-              <a:t> – I think I have wrote </a:t>
-            </a:r>
-            <a:r>
-              <a:rPr lang="en-GB"/>
-              <a:t>to much</a:t>
-            </a:r>
-          </a:p>
-        </p:txBody>
-      </p:sp>
+              <a:t> and implementation maybe 2k words on this 5k on implementation </a:t>
+            </a:r>
+          </a:p>
+          <a:p>
+            <a:endParaRPr lang="en-GB" dirty="0"/>
+          </a:p>
+        </p:txBody>
+      </p:sp>
+      <p:pic>
+        <p:nvPicPr>
+          <p:cNvPr id="1028" name="Picture 4">
+            <a:extLst>
+              <a:ext uri="{FF2B5EF4-FFF2-40B4-BE49-F238E27FC236}">
+                <a16:creationId xmlns:a16="http://schemas.microsoft.com/office/drawing/2014/main" id="{BAE3D6AF-1B34-7400-753E-87C203C75C83}"/>
+              </a:ext>
+            </a:extLst>
+          </p:cNvPr>
+          <p:cNvPicPr>
+            <a:picLocks noChangeAspect="1" noChangeArrowheads="1"/>
+          </p:cNvPicPr>
+          <p:nvPr/>
+        </p:nvPicPr>
+        <p:blipFill>
+          <a:blip r:embed="rId2">
+            <a:extLst>
+              <a:ext uri="{28A0092B-C50C-407E-A947-70E740481C1C}">
+                <a14:useLocalDpi xmlns:a14="http://schemas.microsoft.com/office/drawing/2010/main" val="0"/>
+              </a:ext>
+            </a:extLst>
+          </a:blip>
+          <a:srcRect/>
+          <a:stretch>
+            <a:fillRect/>
+          </a:stretch>
+        </p:blipFill>
+        <p:spPr bwMode="auto">
+          <a:xfrm>
+            <a:off x="2608447" y="2733574"/>
+            <a:ext cx="7210614" cy="3871011"/>
+          </a:xfrm>
+          <a:prstGeom prst="rect">
+            <a:avLst/>
+          </a:prstGeom>
+          <a:noFill/>
+          <a:extLst>
+            <a:ext uri="{909E8E84-426E-40DD-AFC4-6F175D3DCCD1}">
+              <a14:hiddenFill xmlns:a14="http://schemas.microsoft.com/office/drawing/2010/main">
+                <a:solidFill>
+                  <a:srgbClr val="FFFFFF"/>
+                </a:solidFill>
+              </a14:hiddenFill>
+            </a:ext>
+          </a:extLst>
+        </p:spPr>
+      </p:pic>
     </p:spTree>
     <p:extLst>
       <p:ext uri="{BB962C8B-B14F-4D97-AF65-F5344CB8AC3E}">

</xml_diff>

<commit_message>
Report -4K words, Methodology done
</commit_message>
<xml_diff>
--- a/Documentation/Report/Report Layou.pptx
+++ b/Documentation/Report/Report Layou.pptx
@@ -13,10 +13,10 @@
     <p:sldId id="261" r:id="rId7"/>
     <p:sldId id="262" r:id="rId8"/>
     <p:sldId id="263" r:id="rId9"/>
-    <p:sldId id="264" r:id="rId10"/>
-    <p:sldId id="265" r:id="rId11"/>
-    <p:sldId id="266" r:id="rId12"/>
-    <p:sldId id="267" r:id="rId13"/>
+    <p:sldId id="267" r:id="rId10"/>
+    <p:sldId id="264" r:id="rId11"/>
+    <p:sldId id="265" r:id="rId12"/>
+    <p:sldId id="266" r:id="rId13"/>
     <p:sldId id="268" r:id="rId14"/>
     <p:sldId id="269" r:id="rId15"/>
     <p:sldId id="270" r:id="rId16"/>
@@ -276,7 +276,7 @@
           <a:p>
             <a:fld id="{5129EF8E-2A59-46EE-A340-0EE57C336FDC}" type="datetimeFigureOut">
               <a:rPr lang="en-GB" smtClean="0"/>
-              <a:t>18/04/2025</a:t>
+              <a:t>22/04/2025</a:t>
             </a:fld>
             <a:endParaRPr lang="en-GB"/>
           </a:p>
@@ -476,7 +476,7 @@
           <a:p>
             <a:fld id="{5129EF8E-2A59-46EE-A340-0EE57C336FDC}" type="datetimeFigureOut">
               <a:rPr lang="en-GB" smtClean="0"/>
-              <a:t>18/04/2025</a:t>
+              <a:t>22/04/2025</a:t>
             </a:fld>
             <a:endParaRPr lang="en-GB"/>
           </a:p>
@@ -686,7 +686,7 @@
           <a:p>
             <a:fld id="{5129EF8E-2A59-46EE-A340-0EE57C336FDC}" type="datetimeFigureOut">
               <a:rPr lang="en-GB" smtClean="0"/>
-              <a:t>18/04/2025</a:t>
+              <a:t>22/04/2025</a:t>
             </a:fld>
             <a:endParaRPr lang="en-GB"/>
           </a:p>
@@ -886,7 +886,7 @@
           <a:p>
             <a:fld id="{5129EF8E-2A59-46EE-A340-0EE57C336FDC}" type="datetimeFigureOut">
               <a:rPr lang="en-GB" smtClean="0"/>
-              <a:t>18/04/2025</a:t>
+              <a:t>22/04/2025</a:t>
             </a:fld>
             <a:endParaRPr lang="en-GB"/>
           </a:p>
@@ -1162,7 +1162,7 @@
           <a:p>
             <a:fld id="{5129EF8E-2A59-46EE-A340-0EE57C336FDC}" type="datetimeFigureOut">
               <a:rPr lang="en-GB" smtClean="0"/>
-              <a:t>18/04/2025</a:t>
+              <a:t>22/04/2025</a:t>
             </a:fld>
             <a:endParaRPr lang="en-GB"/>
           </a:p>
@@ -1430,7 +1430,7 @@
           <a:p>
             <a:fld id="{5129EF8E-2A59-46EE-A340-0EE57C336FDC}" type="datetimeFigureOut">
               <a:rPr lang="en-GB" smtClean="0"/>
-              <a:t>18/04/2025</a:t>
+              <a:t>22/04/2025</a:t>
             </a:fld>
             <a:endParaRPr lang="en-GB"/>
           </a:p>
@@ -1845,7 +1845,7 @@
           <a:p>
             <a:fld id="{5129EF8E-2A59-46EE-A340-0EE57C336FDC}" type="datetimeFigureOut">
               <a:rPr lang="en-GB" smtClean="0"/>
-              <a:t>18/04/2025</a:t>
+              <a:t>22/04/2025</a:t>
             </a:fld>
             <a:endParaRPr lang="en-GB"/>
           </a:p>
@@ -1987,7 +1987,7 @@
           <a:p>
             <a:fld id="{5129EF8E-2A59-46EE-A340-0EE57C336FDC}" type="datetimeFigureOut">
               <a:rPr lang="en-GB" smtClean="0"/>
-              <a:t>18/04/2025</a:t>
+              <a:t>22/04/2025</a:t>
             </a:fld>
             <a:endParaRPr lang="en-GB"/>
           </a:p>
@@ -2100,7 +2100,7 @@
           <a:p>
             <a:fld id="{5129EF8E-2A59-46EE-A340-0EE57C336FDC}" type="datetimeFigureOut">
               <a:rPr lang="en-GB" smtClean="0"/>
-              <a:t>18/04/2025</a:t>
+              <a:t>22/04/2025</a:t>
             </a:fld>
             <a:endParaRPr lang="en-GB"/>
           </a:p>
@@ -2413,7 +2413,7 @@
           <a:p>
             <a:fld id="{5129EF8E-2A59-46EE-A340-0EE57C336FDC}" type="datetimeFigureOut">
               <a:rPr lang="en-GB" smtClean="0"/>
-              <a:t>18/04/2025</a:t>
+              <a:t>22/04/2025</a:t>
             </a:fld>
             <a:endParaRPr lang="en-GB"/>
           </a:p>
@@ -2702,7 +2702,7 @@
           <a:p>
             <a:fld id="{5129EF8E-2A59-46EE-A340-0EE57C336FDC}" type="datetimeFigureOut">
               <a:rPr lang="en-GB" smtClean="0"/>
-              <a:t>18/04/2025</a:t>
+              <a:t>22/04/2025</a:t>
             </a:fld>
             <a:endParaRPr lang="en-GB"/>
           </a:p>
@@ -2945,7 +2945,7 @@
           <a:p>
             <a:fld id="{5129EF8E-2A59-46EE-A340-0EE57C336FDC}" type="datetimeFigureOut">
               <a:rPr lang="en-GB" smtClean="0"/>
-              <a:t>18/04/2025</a:t>
+              <a:t>22/04/2025</a:t>
             </a:fld>
             <a:endParaRPr lang="en-GB"/>
           </a:p>
@@ -3457,7 +3457,7 @@
           <p:cNvPr id="2" name="Title 1">
             <a:extLst>
               <a:ext uri="{FF2B5EF4-FFF2-40B4-BE49-F238E27FC236}">
-                <a16:creationId xmlns:a16="http://schemas.microsoft.com/office/drawing/2014/main" id="{933C8670-B3BF-6EFB-C9DE-77E4E69712E1}"/>
+                <a16:creationId xmlns:a16="http://schemas.microsoft.com/office/drawing/2014/main" id="{C5D05996-3E1E-FBF7-3F00-612946601515}"/>
               </a:ext>
             </a:extLst>
           </p:cNvPr>
@@ -3475,7 +3475,7 @@
           <a:p>
             <a:r>
               <a:rPr lang="en-GB" dirty="0"/>
-              <a:t>Legal social ethical professional</a:t>
+              <a:t>User Testing </a:t>
             </a:r>
             <a:br>
               <a:rPr lang="en-GB" dirty="0"/>
@@ -3489,7 +3489,7 @@
           <p:cNvPr id="3" name="Content Placeholder 2">
             <a:extLst>
               <a:ext uri="{FF2B5EF4-FFF2-40B4-BE49-F238E27FC236}">
-                <a16:creationId xmlns:a16="http://schemas.microsoft.com/office/drawing/2014/main" id="{A9BB2BF4-B1C6-55C2-5905-DD2AD417E2D1}"/>
+                <a16:creationId xmlns:a16="http://schemas.microsoft.com/office/drawing/2014/main" id="{D896D027-CDD6-F596-1F64-E216DAFBBEB9}"/>
               </a:ext>
             </a:extLst>
           </p:cNvPr>
@@ -3512,7 +3512,7 @@
     </p:spTree>
     <p:extLst>
       <p:ext uri="{BB962C8B-B14F-4D97-AF65-F5344CB8AC3E}">
-        <p14:creationId xmlns:p14="http://schemas.microsoft.com/office/powerpoint/2010/main" val="827883631"/>
+        <p14:creationId xmlns:p14="http://schemas.microsoft.com/office/powerpoint/2010/main" val="84899037"/>
       </p:ext>
     </p:extLst>
   </p:cSld>
@@ -3544,7 +3544,7 @@
           <p:cNvPr id="2" name="Title 1">
             <a:extLst>
               <a:ext uri="{FF2B5EF4-FFF2-40B4-BE49-F238E27FC236}">
-                <a16:creationId xmlns:a16="http://schemas.microsoft.com/office/drawing/2014/main" id="{42FF4AD0-7A62-48CF-0C2A-9EE2AA703E02}"/>
+                <a16:creationId xmlns:a16="http://schemas.microsoft.com/office/drawing/2014/main" id="{933C8670-B3BF-6EFB-C9DE-77E4E69712E1}"/>
               </a:ext>
             </a:extLst>
           </p:cNvPr>
@@ -3562,7 +3562,7 @@
           <a:p>
             <a:r>
               <a:rPr lang="en-GB" dirty="0"/>
-              <a:t>Project Management </a:t>
+              <a:t>Legal social ethical professional</a:t>
             </a:r>
             <a:br>
               <a:rPr lang="en-GB" dirty="0"/>
@@ -3576,7 +3576,7 @@
           <p:cNvPr id="3" name="Content Placeholder 2">
             <a:extLst>
               <a:ext uri="{FF2B5EF4-FFF2-40B4-BE49-F238E27FC236}">
-                <a16:creationId xmlns:a16="http://schemas.microsoft.com/office/drawing/2014/main" id="{A7FFE36D-DE0F-884C-F822-45375261B27B}"/>
+                <a16:creationId xmlns:a16="http://schemas.microsoft.com/office/drawing/2014/main" id="{A9BB2BF4-B1C6-55C2-5905-DD2AD417E2D1}"/>
               </a:ext>
             </a:extLst>
           </p:cNvPr>
@@ -3599,7 +3599,7 @@
     </p:spTree>
     <p:extLst>
       <p:ext uri="{BB962C8B-B14F-4D97-AF65-F5344CB8AC3E}">
-        <p14:creationId xmlns:p14="http://schemas.microsoft.com/office/powerpoint/2010/main" val="4224236707"/>
+        <p14:creationId xmlns:p14="http://schemas.microsoft.com/office/powerpoint/2010/main" val="827883631"/>
       </p:ext>
     </p:extLst>
   </p:cSld>
@@ -3631,7 +3631,7 @@
           <p:cNvPr id="2" name="Title 1">
             <a:extLst>
               <a:ext uri="{FF2B5EF4-FFF2-40B4-BE49-F238E27FC236}">
-                <a16:creationId xmlns:a16="http://schemas.microsoft.com/office/drawing/2014/main" id="{0605A4E8-B986-45C1-8594-3FF41F4492CA}"/>
+                <a16:creationId xmlns:a16="http://schemas.microsoft.com/office/drawing/2014/main" id="{42FF4AD0-7A62-48CF-0C2A-9EE2AA703E02}"/>
               </a:ext>
             </a:extLst>
           </p:cNvPr>
@@ -3649,8 +3649,12 @@
           <a:p>
             <a:r>
               <a:rPr lang="en-GB" dirty="0"/>
-              <a:t>Implementation</a:t>
-            </a:r>
+              <a:t>Project Management </a:t>
+            </a:r>
+            <a:br>
+              <a:rPr lang="en-GB" dirty="0"/>
+            </a:br>
+            <a:endParaRPr lang="en-GB" dirty="0"/>
           </a:p>
         </p:txBody>
       </p:sp>
@@ -3659,7 +3663,7 @@
           <p:cNvPr id="3" name="Content Placeholder 2">
             <a:extLst>
               <a:ext uri="{FF2B5EF4-FFF2-40B4-BE49-F238E27FC236}">
-                <a16:creationId xmlns:a16="http://schemas.microsoft.com/office/drawing/2014/main" id="{1B4C9FA1-AA32-D327-EC5D-6757D6C0B4AC}"/>
+                <a16:creationId xmlns:a16="http://schemas.microsoft.com/office/drawing/2014/main" id="{A7FFE36D-DE0F-884C-F822-45375261B27B}"/>
               </a:ext>
             </a:extLst>
           </p:cNvPr>
@@ -3682,7 +3686,7 @@
     </p:spTree>
     <p:extLst>
       <p:ext uri="{BB962C8B-B14F-4D97-AF65-F5344CB8AC3E}">
-        <p14:creationId xmlns:p14="http://schemas.microsoft.com/office/powerpoint/2010/main" val="3290506538"/>
+        <p14:creationId xmlns:p14="http://schemas.microsoft.com/office/powerpoint/2010/main" val="4224236707"/>
       </p:ext>
     </p:extLst>
   </p:cSld>
@@ -4666,7 +4670,7 @@
           <a:p>
             <a:r>
               <a:rPr lang="en-GB" dirty="0"/>
-              <a:t>Method of approach </a:t>
+              <a:t>Method of approach – Done 2k Words</a:t>
             </a:r>
             <a:br>
               <a:rPr lang="en-GB" dirty="0"/>
@@ -4796,7 +4800,7 @@
           <p:cNvPr id="2" name="Title 1">
             <a:extLst>
               <a:ext uri="{FF2B5EF4-FFF2-40B4-BE49-F238E27FC236}">
-                <a16:creationId xmlns:a16="http://schemas.microsoft.com/office/drawing/2014/main" id="{C5D05996-3E1E-FBF7-3F00-612946601515}"/>
+                <a16:creationId xmlns:a16="http://schemas.microsoft.com/office/drawing/2014/main" id="{0605A4E8-B986-45C1-8594-3FF41F4492CA}"/>
               </a:ext>
             </a:extLst>
           </p:cNvPr>
@@ -4814,11 +4818,12 @@
           <a:p>
             <a:r>
               <a:rPr lang="en-GB" dirty="0"/>
-              <a:t>User Testing </a:t>
-            </a:r>
-            <a:br>
-              <a:rPr lang="en-GB" dirty="0"/>
-            </a:br>
+              <a:t>Implementation – 2.5k, </a:t>
+            </a:r>
+            <a:r>
+              <a:rPr lang="en-GB"/>
+              <a:t>3k words</a:t>
+            </a:r>
             <a:endParaRPr lang="en-GB" dirty="0"/>
           </a:p>
         </p:txBody>
@@ -4828,7 +4833,7 @@
           <p:cNvPr id="3" name="Content Placeholder 2">
             <a:extLst>
               <a:ext uri="{FF2B5EF4-FFF2-40B4-BE49-F238E27FC236}">
-                <a16:creationId xmlns:a16="http://schemas.microsoft.com/office/drawing/2014/main" id="{D896D027-CDD6-F596-1F64-E216DAFBBEB9}"/>
+                <a16:creationId xmlns:a16="http://schemas.microsoft.com/office/drawing/2014/main" id="{1B4C9FA1-AA32-D327-EC5D-6757D6C0B4AC}"/>
               </a:ext>
             </a:extLst>
           </p:cNvPr>
@@ -4851,7 +4856,7 @@
     </p:spTree>
     <p:extLst>
       <p:ext uri="{BB962C8B-B14F-4D97-AF65-F5344CB8AC3E}">
-        <p14:creationId xmlns:p14="http://schemas.microsoft.com/office/powerpoint/2010/main" val="84899037"/>
+        <p14:creationId xmlns:p14="http://schemas.microsoft.com/office/powerpoint/2010/main" val="3290506538"/>
       </p:ext>
     </p:extLst>
   </p:cSld>

</xml_diff>